<commit_message>
Presentations for all lectures
</commit_message>
<xml_diff>
--- a/lecture3/SubstringSearch.pptx
+++ b/lecture3/SubstringSearch.pptx
@@ -321,7 +321,7 @@
           <a:p>
             <a:fld id="{7F5E9BF7-95E4-A242-BA1D-05FDCF603BE6}" type="datetime1">
               <a:rPr lang="en-US" smtClean="0"/>
-              <a:t>2/28/19</a:t>
+              <a:t>5/13/19</a:t>
             </a:fld>
             <a:endParaRPr lang="en-US"/>
           </a:p>
@@ -487,7 +487,7 @@
           <a:p>
             <a:fld id="{165DBCB1-0306-AD41-9452-11E7C08D5C04}" type="datetime1">
               <a:rPr lang="en-US" smtClean="0"/>
-              <a:t>2/28/19</a:t>
+              <a:t>5/13/19</a:t>
             </a:fld>
             <a:endParaRPr lang="en-US"/>
           </a:p>
@@ -2259,31 +2259,24 @@
           </a:p>
         </p:txBody>
       </p:sp>
-      <p:pic>
-        <p:nvPicPr>
-          <p:cNvPr id="8" name="Picture Placeholder 7" descr="logo_cover_5.png"/>
-          <p:cNvPicPr>
-            <a:picLocks noGrp="1" noChangeAspect="1"/>
-          </p:cNvPicPr>
+      <p:sp>
+        <p:nvSpPr>
+          <p:cNvPr id="6" name="Picture Placeholder 5">
+            <a:extLst>
+              <a:ext uri="{FF2B5EF4-FFF2-40B4-BE49-F238E27FC236}">
+                <a16:creationId xmlns:a16="http://schemas.microsoft.com/office/drawing/2014/main" id="{F2969700-84C2-4248-8424-21B2EE79057A}"/>
+              </a:ext>
+            </a:extLst>
+          </p:cNvPr>
+          <p:cNvSpPr>
+            <a:spLocks noGrp="1"/>
+          </p:cNvSpPr>
           <p:nvPr>
             <p:ph type="pic" sz="quarter" idx="18"/>
           </p:nvPr>
-        </p:nvPicPr>
-        <p:blipFill>
-          <a:blip r:embed="rId3">
-            <a:extLst>
-              <a:ext uri="{28A0092B-C50C-407E-A947-70E740481C1C}">
-                <a14:useLocalDpi xmlns:a14="http://schemas.microsoft.com/office/drawing/2010/main" val="0"/>
-              </a:ext>
-            </a:extLst>
-          </a:blip>
-          <a:srcRect t="3538" b="3538"/>
-          <a:stretch>
-            <a:fillRect/>
-          </a:stretch>
-        </p:blipFill>
+        </p:nvSpPr>
         <p:spPr/>
-      </p:pic>
+      </p:sp>
     </p:spTree>
     <p:extLst>
       <p:ext uri="{BB962C8B-B14F-4D97-AF65-F5344CB8AC3E}">
@@ -4463,12 +4456,12 @@
 </file>
 
 <file path=customXml/item1.xml><?xml version="1.0" encoding="utf-8"?>
-<?mso-contentType ?>
-<FormTemplates xmlns="http://schemas.microsoft.com/sharepoint/v3/contenttype/forms">
-  <Display>DocumentLibraryForm</Display>
-  <Edit>DocumentLibraryForm</Edit>
-  <New>DocumentLibraryForm</New>
-</FormTemplates>
+<p:properties xmlns:p="http://schemas.microsoft.com/office/2006/metadata/properties" xmlns:xsi="http://www.w3.org/2001/XMLSchema-instance" xmlns:pc="http://schemas.microsoft.com/office/infopath/2007/PartnerControls">
+  <documentManagement>
+    <PublishingExpirationDate xmlns="http://schemas.microsoft.com/sharepoint/v3" xsi:nil="true"/>
+    <PublishingStartDate xmlns="http://schemas.microsoft.com/sharepoint/v3" xsi:nil="true"/>
+  </documentManagement>
+</p:properties>
 </file>
 
 <file path=customXml/item2.xml><?xml version="1.0" encoding="utf-8"?>
@@ -4604,18 +4597,26 @@
 </file>
 
 <file path=customXml/item3.xml><?xml version="1.0" encoding="utf-8"?>
-<p:properties xmlns:p="http://schemas.microsoft.com/office/2006/metadata/properties" xmlns:xsi="http://www.w3.org/2001/XMLSchema-instance" xmlns:pc="http://schemas.microsoft.com/office/infopath/2007/PartnerControls">
-  <documentManagement>
-    <PublishingExpirationDate xmlns="http://schemas.microsoft.com/sharepoint/v3" xsi:nil="true"/>
-    <PublishingStartDate xmlns="http://schemas.microsoft.com/sharepoint/v3" xsi:nil="true"/>
-  </documentManagement>
-</p:properties>
+<?mso-contentType ?>
+<FormTemplates xmlns="http://schemas.microsoft.com/sharepoint/v3/contenttype/forms">
+  <Display>DocumentLibraryForm</Display>
+  <Edit>DocumentLibraryForm</Edit>
+  <New>DocumentLibraryForm</New>
+</FormTemplates>
 </file>
 
 <file path=customXml/itemProps1.xml><?xml version="1.0" encoding="utf-8"?>
-<ds:datastoreItem xmlns:ds="http://schemas.openxmlformats.org/officeDocument/2006/customXml" ds:itemID="{14883F0F-DE57-4ECA-B9BB-F22E8C5B5D82}">
+<ds:datastoreItem xmlns:ds="http://schemas.openxmlformats.org/officeDocument/2006/customXml" ds:itemID="{D5E3C081-4081-47AD-A9A6-9F18F525DA1D}">
   <ds:schemaRefs>
-    <ds:schemaRef ds:uri="http://schemas.microsoft.com/sharepoint/v3/contenttype/forms"/>
+    <ds:schemaRef ds:uri="http://purl.org/dc/terms/"/>
+    <ds:schemaRef ds:uri="http://purl.org/dc/elements/1.1/"/>
+    <ds:schemaRef ds:uri="http://schemas.microsoft.com/office/2006/documentManagement/types"/>
+    <ds:schemaRef ds:uri="http://schemas.microsoft.com/office/2006/metadata/properties"/>
+    <ds:schemaRef ds:uri="http://purl.org/dc/dcmitype/"/>
+    <ds:schemaRef ds:uri="http://schemas.microsoft.com/office/infopath/2007/PartnerControls"/>
+    <ds:schemaRef ds:uri="http://schemas.microsoft.com/sharepoint/v3"/>
+    <ds:schemaRef ds:uri="http://schemas.openxmlformats.org/package/2006/metadata/core-properties"/>
+    <ds:schemaRef ds:uri="http://www.w3.org/XML/1998/namespace"/>
   </ds:schemaRefs>
 </ds:datastoreItem>
 </file>
@@ -4639,17 +4640,9 @@
 </file>
 
 <file path=customXml/itemProps3.xml><?xml version="1.0" encoding="utf-8"?>
-<ds:datastoreItem xmlns:ds="http://schemas.openxmlformats.org/officeDocument/2006/customXml" ds:itemID="{D5E3C081-4081-47AD-A9A6-9F18F525DA1D}">
+<ds:datastoreItem xmlns:ds="http://schemas.openxmlformats.org/officeDocument/2006/customXml" ds:itemID="{14883F0F-DE57-4ECA-B9BB-F22E8C5B5D82}">
   <ds:schemaRefs>
-    <ds:schemaRef ds:uri="http://purl.org/dc/terms/"/>
-    <ds:schemaRef ds:uri="http://purl.org/dc/elements/1.1/"/>
-    <ds:schemaRef ds:uri="http://schemas.microsoft.com/office/2006/documentManagement/types"/>
-    <ds:schemaRef ds:uri="http://schemas.microsoft.com/office/2006/metadata/properties"/>
-    <ds:schemaRef ds:uri="http://purl.org/dc/dcmitype/"/>
-    <ds:schemaRef ds:uri="http://schemas.microsoft.com/office/infopath/2007/PartnerControls"/>
-    <ds:schemaRef ds:uri="http://schemas.microsoft.com/sharepoint/v3"/>
-    <ds:schemaRef ds:uri="http://schemas.openxmlformats.org/package/2006/metadata/core-properties"/>
-    <ds:schemaRef ds:uri="http://www.w3.org/XML/1998/namespace"/>
+    <ds:schemaRef ds:uri="http://schemas.microsoft.com/sharepoint/v3/contenttype/forms"/>
   </ds:schemaRefs>
 </ds:datastoreItem>
 </file>
</xml_diff>